<commit_message>
added 'thumbnail' field to the PhotoIssue field
</commit_message>
<xml_diff>
--- a/Scams of New York City.pptx
+++ b/Scams of New York City.pptx
@@ -200,7 +200,7 @@
           <a:p>
             <a:fld id="{9EBF139F-3677-433E-87F3-F598681241D3}" type="datetimeFigureOut">
               <a:rPr lang="en-US" smtClean="0"/>
-              <a:t>1/8/2015</a:t>
+              <a:t>1/9/2015</a:t>
             </a:fld>
             <a:endParaRPr lang="en-US"/>
           </a:p>
@@ -880,7 +880,7 @@
           <a:p>
             <a:fld id="{F3B1CBE9-3894-437C-9491-BF861BC42FDF}" type="datetimeFigureOut">
               <a:rPr lang="en-US" smtClean="0"/>
-              <a:t>1/8/2015</a:t>
+              <a:t>1/9/2015</a:t>
             </a:fld>
             <a:endParaRPr lang="en-US"/>
           </a:p>
@@ -1050,7 +1050,7 @@
           <a:p>
             <a:fld id="{F3B1CBE9-3894-437C-9491-BF861BC42FDF}" type="datetimeFigureOut">
               <a:rPr lang="en-US" smtClean="0"/>
-              <a:t>1/8/2015</a:t>
+              <a:t>1/9/2015</a:t>
             </a:fld>
             <a:endParaRPr lang="en-US"/>
           </a:p>
@@ -1230,7 +1230,7 @@
           <a:p>
             <a:fld id="{F3B1CBE9-3894-437C-9491-BF861BC42FDF}" type="datetimeFigureOut">
               <a:rPr lang="en-US" smtClean="0"/>
-              <a:t>1/8/2015</a:t>
+              <a:t>1/9/2015</a:t>
             </a:fld>
             <a:endParaRPr lang="en-US"/>
           </a:p>
@@ -1400,7 +1400,7 @@
           <a:p>
             <a:fld id="{F3B1CBE9-3894-437C-9491-BF861BC42FDF}" type="datetimeFigureOut">
               <a:rPr lang="en-US" smtClean="0"/>
-              <a:t>1/8/2015</a:t>
+              <a:t>1/9/2015</a:t>
             </a:fld>
             <a:endParaRPr lang="en-US"/>
           </a:p>
@@ -1646,7 +1646,7 @@
           <a:p>
             <a:fld id="{F3B1CBE9-3894-437C-9491-BF861BC42FDF}" type="datetimeFigureOut">
               <a:rPr lang="en-US" smtClean="0"/>
-              <a:t>1/8/2015</a:t>
+              <a:t>1/9/2015</a:t>
             </a:fld>
             <a:endParaRPr lang="en-US"/>
           </a:p>
@@ -1878,7 +1878,7 @@
           <a:p>
             <a:fld id="{F3B1CBE9-3894-437C-9491-BF861BC42FDF}" type="datetimeFigureOut">
               <a:rPr lang="en-US" smtClean="0"/>
-              <a:t>1/8/2015</a:t>
+              <a:t>1/9/2015</a:t>
             </a:fld>
             <a:endParaRPr lang="en-US"/>
           </a:p>
@@ -2245,7 +2245,7 @@
           <a:p>
             <a:fld id="{F3B1CBE9-3894-437C-9491-BF861BC42FDF}" type="datetimeFigureOut">
               <a:rPr lang="en-US" smtClean="0"/>
-              <a:t>1/8/2015</a:t>
+              <a:t>1/9/2015</a:t>
             </a:fld>
             <a:endParaRPr lang="en-US"/>
           </a:p>
@@ -2363,7 +2363,7 @@
           <a:p>
             <a:fld id="{F3B1CBE9-3894-437C-9491-BF861BC42FDF}" type="datetimeFigureOut">
               <a:rPr lang="en-US" smtClean="0"/>
-              <a:t>1/8/2015</a:t>
+              <a:t>1/9/2015</a:t>
             </a:fld>
             <a:endParaRPr lang="en-US"/>
           </a:p>
@@ -2458,7 +2458,7 @@
           <a:p>
             <a:fld id="{F3B1CBE9-3894-437C-9491-BF861BC42FDF}" type="datetimeFigureOut">
               <a:rPr lang="en-US" smtClean="0"/>
-              <a:t>1/8/2015</a:t>
+              <a:t>1/9/2015</a:t>
             </a:fld>
             <a:endParaRPr lang="en-US"/>
           </a:p>
@@ -2735,7 +2735,7 @@
           <a:p>
             <a:fld id="{F3B1CBE9-3894-437C-9491-BF861BC42FDF}" type="datetimeFigureOut">
               <a:rPr lang="en-US" smtClean="0"/>
-              <a:t>1/8/2015</a:t>
+              <a:t>1/9/2015</a:t>
             </a:fld>
             <a:endParaRPr lang="en-US"/>
           </a:p>
@@ -2988,7 +2988,7 @@
           <a:p>
             <a:fld id="{F3B1CBE9-3894-437C-9491-BF861BC42FDF}" type="datetimeFigureOut">
               <a:rPr lang="en-US" smtClean="0"/>
-              <a:t>1/8/2015</a:t>
+              <a:t>1/9/2015</a:t>
             </a:fld>
             <a:endParaRPr lang="en-US"/>
           </a:p>
@@ -3201,7 +3201,7 @@
           <a:p>
             <a:fld id="{F3B1CBE9-3894-437C-9491-BF861BC42FDF}" type="datetimeFigureOut">
               <a:rPr lang="en-US" smtClean="0"/>
-              <a:t>1/8/2015</a:t>
+              <a:t>1/9/2015</a:t>
             </a:fld>
             <a:endParaRPr lang="en-US"/>
           </a:p>
@@ -3625,7 +3625,11 @@
           <a:p>
             <a:r>
               <a:rPr lang="en-US" sz="8000" b="1" dirty="0"/>
-              <a:t>Scams of New York City</a:t>
+              <a:t>Scams of New </a:t>
+            </a:r>
+            <a:r>
+              <a:rPr lang="en-US" sz="8000" b="1" dirty="0" smtClean="0"/>
+              <a:t>York</a:t>
             </a:r>
             <a:r>
               <a:rPr lang="en-US" b="0" dirty="0" smtClean="0">
@@ -3639,8 +3643,12 @@
               </a:rPr>
             </a:br>
             <a:r>
-              <a:rPr lang="en-US" sz="2700" b="1" dirty="0"/>
-              <a:t>Detecting (possibly) bogus listings with duplicate image detection</a:t>
+              <a:rPr lang="en-US" sz="3100" b="1" dirty="0"/>
+              <a:t>Detecting </a:t>
+            </a:r>
+            <a:r>
+              <a:rPr lang="en-US" sz="3100" b="1" dirty="0" smtClean="0"/>
+              <a:t>problem listings through image matching</a:t>
             </a:r>
             <a:r>
               <a:rPr lang="en-US" sz="2700" b="0" dirty="0" smtClean="0">
@@ -3997,7 +4005,6 @@
               <a:rPr lang="en-US" dirty="0" smtClean="0"/>
               <a:t>Scams cost Move money</a:t>
             </a:r>
-            <a:endParaRPr lang="en-US" dirty="0" smtClean="0"/>
           </a:p>
         </p:txBody>
       </p:sp>
@@ -4026,21 +4033,10 @@
               <a:t> </a:t>
             </a:r>
             <a:r>
-              <a:rPr lang="en-US" sz="3200" dirty="0"/>
-              <a:t>Users </a:t>
-            </a:r>
-            <a:r>
               <a:rPr lang="en-US" sz="3200" dirty="0" smtClean="0"/>
-              <a:t>lose </a:t>
-            </a:r>
-            <a:r>
-              <a:rPr lang="en-US" sz="3200" dirty="0"/>
-              <a:t>trust in our site, and stop coming </a:t>
-            </a:r>
-            <a:r>
-              <a:rPr lang="en-US" sz="3200" dirty="0" smtClean="0"/>
-              <a:t>back</a:t>
-            </a:r>
+              <a:t>loss of trust / brand damage</a:t>
+            </a:r>
+            <a:endParaRPr lang="en-US" sz="3200" dirty="0" smtClean="0"/>
           </a:p>
           <a:p>
             <a:pPr>
@@ -4053,7 +4049,11 @@
           <a:p>
             <a:r>
               <a:rPr lang="en-US" sz="3200" dirty="0"/>
-              <a:t>Legitimate pay-per-click advertisers don't get as many leads or </a:t>
+              <a:t>Legitimate </a:t>
+            </a:r>
+            <a:r>
+              <a:rPr lang="en-US" sz="3200" dirty="0" smtClean="0"/>
+              <a:t>advertisers lose leads / </a:t>
             </a:r>
             <a:r>
               <a:rPr lang="en-US" sz="3200" dirty="0" smtClean="0"/>
@@ -4070,8 +4070,13 @@
             </a:r>
             <a:r>
               <a:rPr lang="en-US" sz="3200" dirty="0"/>
-              <a:t>support and tech support has to investigate and remove problematic listings</a:t>
-            </a:r>
+              <a:t>support </a:t>
+            </a:r>
+            <a:r>
+              <a:rPr lang="en-US" sz="3200" dirty="0" smtClean="0"/>
+              <a:t>costs</a:t>
+            </a:r>
+            <a:endParaRPr lang="en-US" sz="3200" dirty="0"/>
           </a:p>
         </p:txBody>
       </p:sp>
@@ -4088,182 +4093,9 @@
   <p:timing>
     <p:tnLst>
       <p:par>
-        <p:cTn id="1" dur="indefinite" restart="never" nodeType="tmRoot">
-          <p:childTnLst>
-            <p:seq concurrent="1" nextAc="seek">
-              <p:cTn id="2" dur="indefinite" nodeType="mainSeq">
-                <p:childTnLst>
-                  <p:par>
-                    <p:cTn id="3" fill="hold">
-                      <p:stCondLst>
-                        <p:cond delay="indefinite"/>
-                      </p:stCondLst>
-                      <p:childTnLst>
-                        <p:par>
-                          <p:cTn id="4" fill="hold">
-                            <p:stCondLst>
-                              <p:cond delay="0"/>
-                            </p:stCondLst>
-                            <p:childTnLst>
-                              <p:par>
-                                <p:cTn id="5" presetID="1" presetClass="entr" presetSubtype="0" fill="hold" grpId="0" nodeType="clickEffect">
-                                  <p:stCondLst>
-                                    <p:cond delay="0"/>
-                                  </p:stCondLst>
-                                  <p:childTnLst>
-                                    <p:set>
-                                      <p:cBhvr>
-                                        <p:cTn id="6" dur="1" fill="hold">
-                                          <p:stCondLst>
-                                            <p:cond delay="0"/>
-                                          </p:stCondLst>
-                                        </p:cTn>
-                                        <p:tgtEl>
-                                          <p:spTgt spid="3">
-                                            <p:txEl>
-                                              <p:pRg st="1" end="1"/>
-                                            </p:txEl>
-                                          </p:spTgt>
-                                        </p:tgtEl>
-                                        <p:attrNameLst>
-                                          <p:attrName>style.visibility</p:attrName>
-                                        </p:attrNameLst>
-                                      </p:cBhvr>
-                                      <p:to>
-                                        <p:strVal val="visible"/>
-                                      </p:to>
-                                    </p:set>
-                                  </p:childTnLst>
-                                </p:cTn>
-                              </p:par>
-                            </p:childTnLst>
-                          </p:cTn>
-                        </p:par>
-                      </p:childTnLst>
-                    </p:cTn>
-                  </p:par>
-                  <p:par>
-                    <p:cTn id="7" fill="hold">
-                      <p:stCondLst>
-                        <p:cond delay="indefinite"/>
-                      </p:stCondLst>
-                      <p:childTnLst>
-                        <p:par>
-                          <p:cTn id="8" fill="hold">
-                            <p:stCondLst>
-                              <p:cond delay="0"/>
-                            </p:stCondLst>
-                            <p:childTnLst>
-                              <p:par>
-                                <p:cTn id="9" presetID="1" presetClass="entr" presetSubtype="0" fill="hold" grpId="0" nodeType="clickEffect">
-                                  <p:stCondLst>
-                                    <p:cond delay="0"/>
-                                  </p:stCondLst>
-                                  <p:childTnLst>
-                                    <p:set>
-                                      <p:cBhvr>
-                                        <p:cTn id="10" dur="1" fill="hold">
-                                          <p:stCondLst>
-                                            <p:cond delay="0"/>
-                                          </p:stCondLst>
-                                        </p:cTn>
-                                        <p:tgtEl>
-                                          <p:spTgt spid="3">
-                                            <p:txEl>
-                                              <p:pRg st="3" end="3"/>
-                                            </p:txEl>
-                                          </p:spTgt>
-                                        </p:tgtEl>
-                                        <p:attrNameLst>
-                                          <p:attrName>style.visibility</p:attrName>
-                                        </p:attrNameLst>
-                                      </p:cBhvr>
-                                      <p:to>
-                                        <p:strVal val="visible"/>
-                                      </p:to>
-                                    </p:set>
-                                  </p:childTnLst>
-                                </p:cTn>
-                              </p:par>
-                            </p:childTnLst>
-                          </p:cTn>
-                        </p:par>
-                      </p:childTnLst>
-                    </p:cTn>
-                  </p:par>
-                  <p:par>
-                    <p:cTn id="11" fill="hold">
-                      <p:stCondLst>
-                        <p:cond delay="indefinite"/>
-                      </p:stCondLst>
-                      <p:childTnLst>
-                        <p:par>
-                          <p:cTn id="12" fill="hold">
-                            <p:stCondLst>
-                              <p:cond delay="0"/>
-                            </p:stCondLst>
-                            <p:childTnLst>
-                              <p:par>
-                                <p:cTn id="13" presetID="1" presetClass="entr" presetSubtype="0" fill="hold" grpId="0" nodeType="clickEffect">
-                                  <p:stCondLst>
-                                    <p:cond delay="0"/>
-                                  </p:stCondLst>
-                                  <p:childTnLst>
-                                    <p:set>
-                                      <p:cBhvr>
-                                        <p:cTn id="14" dur="1" fill="hold">
-                                          <p:stCondLst>
-                                            <p:cond delay="0"/>
-                                          </p:stCondLst>
-                                        </p:cTn>
-                                        <p:tgtEl>
-                                          <p:spTgt spid="3">
-                                            <p:txEl>
-                                              <p:pRg st="5" end="5"/>
-                                            </p:txEl>
-                                          </p:spTgt>
-                                        </p:tgtEl>
-                                        <p:attrNameLst>
-                                          <p:attrName>style.visibility</p:attrName>
-                                        </p:attrNameLst>
-                                      </p:cBhvr>
-                                      <p:to>
-                                        <p:strVal val="visible"/>
-                                      </p:to>
-                                    </p:set>
-                                  </p:childTnLst>
-                                </p:cTn>
-                              </p:par>
-                            </p:childTnLst>
-                          </p:cTn>
-                        </p:par>
-                      </p:childTnLst>
-                    </p:cTn>
-                  </p:par>
-                </p:childTnLst>
-              </p:cTn>
-              <p:prevCondLst>
-                <p:cond evt="onPrev" delay="0">
-                  <p:tgtEl>
-                    <p:sldTgt/>
-                  </p:tgtEl>
-                </p:cond>
-              </p:prevCondLst>
-              <p:nextCondLst>
-                <p:cond evt="onNext" delay="0">
-                  <p:tgtEl>
-                    <p:sldTgt/>
-                  </p:tgtEl>
-                </p:cond>
-              </p:nextCondLst>
-            </p:seq>
-          </p:childTnLst>
-        </p:cTn>
+        <p:cTn id="1" dur="indefinite" restart="never" nodeType="tmRoot"/>
       </p:par>
     </p:tnLst>
-    <p:bldLst>
-      <p:bldP spid="3" grpId="0" build="p"/>
-    </p:bldLst>
   </p:timing>
 </p:sld>
 </file>
@@ -4599,13 +4431,11 @@
           <a:p>
             <a:r>
               <a:rPr lang="en-US" dirty="0" smtClean="0"/>
-              <a:t>Sometimes photos are ‘reused’ for multiple apartments in a building</a:t>
-            </a:r>
-          </a:p>
-          <a:p>
+              <a:t>Multiple </a:t>
+            </a:r>
             <a:r>
               <a:rPr lang="en-US" dirty="0" smtClean="0"/>
-              <a:t>Multiple listings are not de-duplicated properly</a:t>
+              <a:t>listings are not de-duplicated properly</a:t>
             </a:r>
           </a:p>
           <a:p>
@@ -4718,56 +4548,7 @@
                                         <p:tgtEl>
                                           <p:spTgt spid="3">
                                             <p:txEl>
-                                              <p:pRg st="1" end="1"/>
-                                            </p:txEl>
-                                          </p:spTgt>
-                                        </p:tgtEl>
-                                        <p:attrNameLst>
-                                          <p:attrName>style.visibility</p:attrName>
-                                        </p:attrNameLst>
-                                      </p:cBhvr>
-                                      <p:to>
-                                        <p:strVal val="visible"/>
-                                      </p:to>
-                                    </p:set>
-                                  </p:childTnLst>
-                                </p:cTn>
-                              </p:par>
-                            </p:childTnLst>
-                          </p:cTn>
-                        </p:par>
-                      </p:childTnLst>
-                    </p:cTn>
-                  </p:par>
-                  <p:par>
-                    <p:cTn id="11" fill="hold">
-                      <p:stCondLst>
-                        <p:cond delay="indefinite"/>
-                      </p:stCondLst>
-                      <p:childTnLst>
-                        <p:par>
-                          <p:cTn id="12" fill="hold">
-                            <p:stCondLst>
-                              <p:cond delay="0"/>
-                            </p:stCondLst>
-                            <p:childTnLst>
-                              <p:par>
-                                <p:cTn id="13" presetID="1" presetClass="entr" presetSubtype="0" fill="hold" grpId="0" nodeType="clickEffect">
-                                  <p:stCondLst>
-                                    <p:cond delay="0"/>
-                                  </p:stCondLst>
-                                  <p:childTnLst>
-                                    <p:set>
-                                      <p:cBhvr>
-                                        <p:cTn id="14" dur="1" fill="hold">
-                                          <p:stCondLst>
-                                            <p:cond delay="0"/>
-                                          </p:stCondLst>
-                                        </p:cTn>
-                                        <p:tgtEl>
-                                          <p:spTgt spid="3">
-                                            <p:txEl>
-                                              <p:pRg st="3" end="3"/>
+                                              <p:pRg st="2" end="2"/>
                                             </p:txEl>
                                           </p:spTgt>
                                         </p:tgtEl>
@@ -5632,7 +5413,7 @@
   <a:extraClrSchemeLst/>
   <a:extLst>
     <a:ext uri="{05A4C25C-085E-4340-85A3-A5531E510DB2}">
-      <thm15:themeFamily xmlns:thm15="http://schemas.microsoft.com/office/thememl/2012/main" name="Office Theme" id="{62F939B6-93AF-4DB8-9C6B-D6C7DFDC589F}" vid="{4A3C46E8-61CC-4603-A589-7422A47A8E4A}"/>
+      <thm15:themeFamily xmlns:thm15="http://schemas.microsoft.com/office/thememl/2012/main" xmlns="" name="Office Theme" id="{62F939B6-93AF-4DB8-9C6B-D6C7DFDC589F}" vid="{4A3C46E8-61CC-4603-A589-7422A47A8E4A}"/>
     </a:ext>
   </a:extLst>
 </a:theme>
@@ -5893,7 +5674,7 @@
   <a:extraClrSchemeLst/>
   <a:extLst>
     <a:ext uri="{05A4C25C-085E-4340-85A3-A5531E510DB2}">
-      <thm15:themeFamily xmlns:thm15="http://schemas.microsoft.com/office/thememl/2012/main" name="Office Theme" id="{62F939B6-93AF-4DB8-9C6B-D6C7DFDC589F}" vid="{4A3C46E8-61CC-4603-A589-7422A47A8E4A}"/>
+      <thm15:themeFamily xmlns:thm15="http://schemas.microsoft.com/office/thememl/2012/main" xmlns="" name="Office Theme" id="{62F939B6-93AF-4DB8-9C6B-D6C7DFDC589F}" vid="{4A3C46E8-61CC-4603-A589-7422A47A8E4A}"/>
     </a:ext>
   </a:extLst>
 </a:theme>

</xml_diff>